<commit_message>
S=0, 16QAM SNR not changed
</commit_message>
<xml_diff>
--- a/documents/effcom-meeting-0830.pptx
+++ b/documents/effcom-meeting-0830.pptx
@@ -5073,6 +5073,42 @@
           <a:chExt cx="0" cy="0"/>
         </a:xfrm>
       </p:grpSpPr>
+      <p:pic>
+        <p:nvPicPr>
+          <p:cNvPr id="5" name="Picture 4" descr="A close up of a map&#10;&#10;Description generated with high confidence">
+            <a:extLst>
+              <a:ext uri="{FF2B5EF4-FFF2-40B4-BE49-F238E27FC236}">
+                <a16:creationId xmlns:a16="http://schemas.microsoft.com/office/drawing/2014/main" id="{74216691-35E6-4D2E-91E1-DA5B2355FBF9}"/>
+              </a:ext>
+            </a:extLst>
+          </p:cNvPr>
+          <p:cNvPicPr>
+            <a:picLocks noChangeAspect="1"/>
+          </p:cNvPicPr>
+          <p:nvPr/>
+        </p:nvPicPr>
+        <p:blipFill>
+          <a:blip r:embed="rId2">
+            <a:extLst>
+              <a:ext uri="{28A0092B-C50C-407E-A947-70E740481C1C}">
+                <a14:useLocalDpi xmlns:a14="http://schemas.microsoft.com/office/drawing/2010/main" val="0"/>
+              </a:ext>
+            </a:extLst>
+          </a:blip>
+          <a:stretch>
+            <a:fillRect/>
+          </a:stretch>
+        </p:blipFill>
+        <p:spPr>
+          <a:xfrm>
+            <a:off x="2633472" y="2020824"/>
+            <a:ext cx="6933333" cy="5200000"/>
+          </a:xfrm>
+          <a:prstGeom prst="rect">
+            <a:avLst/>
+          </a:prstGeom>
+        </p:spPr>
+      </p:pic>
       <p:sp>
         <p:nvSpPr>
           <p:cNvPr id="2" name="Title 1">

</xml_diff>

<commit_message>
Simulate varying channel spacing
</commit_message>
<xml_diff>
--- a/documents/effcom-meeting-0830.pptx
+++ b/documents/effcom-meeting-0830.pptx
@@ -18,6 +18,7 @@
     <p:sldId id="265" r:id="rId12"/>
     <p:sldId id="266" r:id="rId13"/>
     <p:sldId id="267" r:id="rId14"/>
+    <p:sldId id="270" r:id="rId15"/>
   </p:sldIdLst>
   <p:sldSz cx="12192000" cy="6858000"/>
   <p:notesSz cx="6858000" cy="9144000"/>
@@ -3958,6 +3959,192 @@
 </p:sld>
 </file>
 
+<file path=ppt/slides/slide14.xml><?xml version="1.0" encoding="utf-8"?>
+<p:sld xmlns:a="http://schemas.openxmlformats.org/drawingml/2006/main" xmlns:r="http://schemas.openxmlformats.org/officeDocument/2006/relationships" xmlns:p="http://schemas.openxmlformats.org/presentationml/2006/main">
+  <p:cSld>
+    <p:spTree>
+      <p:nvGrpSpPr>
+        <p:cNvPr id="1" name=""/>
+        <p:cNvGrpSpPr/>
+        <p:nvPr/>
+      </p:nvGrpSpPr>
+      <p:grpSpPr>
+        <a:xfrm>
+          <a:off x="0" y="0"/>
+          <a:ext cx="0" cy="0"/>
+          <a:chOff x="0" y="0"/>
+          <a:chExt cx="0" cy="0"/>
+        </a:xfrm>
+      </p:grpSpPr>
+      <p:pic>
+        <p:nvPicPr>
+          <p:cNvPr id="6" name="Picture 5" descr="A screenshot of a cell phone&#10;&#10;Description generated with high confidence">
+            <a:extLst>
+              <a:ext uri="{FF2B5EF4-FFF2-40B4-BE49-F238E27FC236}">
+                <a16:creationId xmlns:a16="http://schemas.microsoft.com/office/drawing/2014/main" id="{98AC1214-DDC3-44D8-9C9C-6D4F16837806}"/>
+              </a:ext>
+            </a:extLst>
+          </p:cNvPr>
+          <p:cNvPicPr>
+            <a:picLocks noChangeAspect="1"/>
+          </p:cNvPicPr>
+          <p:nvPr/>
+        </p:nvPicPr>
+        <p:blipFill>
+          <a:blip r:embed="rId2">
+            <a:extLst>
+              <a:ext uri="{28A0092B-C50C-407E-A947-70E740481C1C}">
+                <a14:useLocalDpi xmlns:a14="http://schemas.microsoft.com/office/drawing/2010/main" val="0"/>
+              </a:ext>
+            </a:extLst>
+          </a:blip>
+          <a:stretch>
+            <a:fillRect/>
+          </a:stretch>
+        </p:blipFill>
+        <p:spPr>
+          <a:xfrm>
+            <a:off x="3635106" y="2801534"/>
+            <a:ext cx="4921788" cy="3691341"/>
+          </a:xfrm>
+          <a:prstGeom prst="rect">
+            <a:avLst/>
+          </a:prstGeom>
+        </p:spPr>
+      </p:pic>
+      <p:sp>
+        <p:nvSpPr>
+          <p:cNvPr id="2" name="Title 1">
+            <a:extLst>
+              <a:ext uri="{FF2B5EF4-FFF2-40B4-BE49-F238E27FC236}">
+                <a16:creationId xmlns:a16="http://schemas.microsoft.com/office/drawing/2014/main" id="{06E8FE1A-F0B2-4CB3-864C-99BE41C5E47F}"/>
+              </a:ext>
+            </a:extLst>
+          </p:cNvPr>
+          <p:cNvSpPr>
+            <a:spLocks noGrp="1"/>
+          </p:cNvSpPr>
+          <p:nvPr>
+            <p:ph type="title"/>
+          </p:nvPr>
+        </p:nvSpPr>
+        <p:spPr/>
+        <p:txBody>
+          <a:bodyPr/>
+          <a:lstStyle/>
+          <a:p>
+            <a:r>
+              <a:rPr lang="sv-SE" dirty="0" err="1"/>
+              <a:t>Suspiciously</a:t>
+            </a:r>
+            <a:r>
+              <a:rPr lang="sv-SE" dirty="0"/>
+              <a:t> </a:t>
+            </a:r>
+            <a:r>
+              <a:rPr lang="sv-SE" dirty="0" err="1"/>
+              <a:t>Low</a:t>
+            </a:r>
+            <a:r>
+              <a:rPr lang="sv-SE" dirty="0"/>
+              <a:t> SNR</a:t>
+            </a:r>
+          </a:p>
+        </p:txBody>
+      </p:sp>
+      <p:sp>
+        <p:nvSpPr>
+          <p:cNvPr id="3" name="Content Placeholder 2">
+            <a:extLst>
+              <a:ext uri="{FF2B5EF4-FFF2-40B4-BE49-F238E27FC236}">
+                <a16:creationId xmlns:a16="http://schemas.microsoft.com/office/drawing/2014/main" id="{48A80F13-8004-48AD-A1CD-ADABF3E04454}"/>
+              </a:ext>
+            </a:extLst>
+          </p:cNvPr>
+          <p:cNvSpPr>
+            <a:spLocks noGrp="1"/>
+          </p:cNvSpPr>
+          <p:nvPr>
+            <p:ph idx="1"/>
+          </p:nvPr>
+        </p:nvSpPr>
+        <p:spPr/>
+        <p:txBody>
+          <a:bodyPr/>
+          <a:lstStyle/>
+          <a:p>
+            <a:r>
+              <a:rPr lang="sv-SE" dirty="0" err="1"/>
+              <a:t>Maybe</a:t>
+            </a:r>
+            <a:r>
+              <a:rPr lang="sv-SE" dirty="0"/>
+              <a:t> </a:t>
+            </a:r>
+            <a:r>
+              <a:rPr lang="sv-SE" dirty="0" err="1"/>
+              <a:t>calculate</a:t>
+            </a:r>
+            <a:r>
+              <a:rPr lang="sv-SE" dirty="0"/>
+              <a:t> SNR </a:t>
+            </a:r>
+            <a:r>
+              <a:rPr lang="sv-SE" dirty="0" err="1"/>
+              <a:t>wrongly</a:t>
+            </a:r>
+            <a:endParaRPr lang="sv-SE" dirty="0"/>
+          </a:p>
+          <a:p>
+            <a:pPr lvl="1"/>
+            <a:r>
+              <a:rPr lang="sv-SE" dirty="0" err="1"/>
+              <a:t>When</a:t>
+            </a:r>
+            <a:r>
+              <a:rPr lang="sv-SE" dirty="0"/>
+              <a:t> no ASE </a:t>
+            </a:r>
+            <a:r>
+              <a:rPr lang="sv-SE" dirty="0" err="1"/>
+              <a:t>noise</a:t>
+            </a:r>
+            <a:r>
+              <a:rPr lang="sv-SE" dirty="0"/>
+              <a:t>, γ=0, </a:t>
+            </a:r>
+            <a:r>
+              <a:rPr lang="sv-SE" dirty="0" err="1"/>
+              <a:t>perfect</a:t>
+            </a:r>
+            <a:r>
+              <a:rPr lang="sv-SE" dirty="0"/>
+              <a:t> </a:t>
+            </a:r>
+            <a:r>
+              <a:rPr lang="sv-SE" dirty="0" err="1"/>
+              <a:t>constellation</a:t>
+            </a:r>
+            <a:r>
+              <a:rPr lang="sv-SE" dirty="0"/>
+              <a:t> diagram</a:t>
+            </a:r>
+          </a:p>
+        </p:txBody>
+      </p:sp>
+    </p:spTree>
+    <p:extLst>
+      <p:ext uri="{BB962C8B-B14F-4D97-AF65-F5344CB8AC3E}">
+        <p14:creationId xmlns:p14="http://schemas.microsoft.com/office/powerpoint/2010/main" val="1520607763"/>
+      </p:ext>
+    </p:extLst>
+  </p:cSld>
+  <p:clrMapOvr>
+    <a:masterClrMapping/>
+  </p:clrMapOvr>
+</p:sld>
+</file>
+
 <file path=ppt/slides/slide2.xml><?xml version="1.0" encoding="utf-8"?>
 <p:sld xmlns:a="http://schemas.openxmlformats.org/drawingml/2006/main" xmlns:r="http://schemas.openxmlformats.org/officeDocument/2006/relationships" xmlns:p="http://schemas.openxmlformats.org/presentationml/2006/main">
   <p:cSld>

</xml_diff>